<commit_message>
Link to GitHub repo added
Link to GitHub repo added
</commit_message>
<xml_diff>
--- a/Nishant Rathore - Community Meeting.pptx
+++ b/Nishant Rathore - Community Meeting.pptx
@@ -3959,7 +3959,7 @@
         <p:spPr>
           <a:xfrm>
             <a:off x="1600200" y="1143000"/>
-            <a:ext cx="8382000" cy="3416320"/>
+            <a:ext cx="8382000" cy="4247317"/>
           </a:xfrm>
           <a:prstGeom prst="rect">
             <a:avLst/>
@@ -4019,7 +4019,31 @@
             <a:endParaRPr lang="en-US" dirty="0"/>
           </a:p>
           <a:p>
-            <a:endParaRPr lang="en-US"/>
+            <a:endParaRPr lang="en-US" dirty="0"/>
+          </a:p>
+          <a:p>
+            <a:r>
+              <a:rPr lang="en-CA" dirty="0">
+                <a:hlinkClick r:id="rId4"/>
+              </a:rPr>
+              <a:t>nishant7rathore/</a:t>
+            </a:r>
+            <a:r>
+              <a:rPr lang="en-CA" dirty="0" err="1">
+                <a:hlinkClick r:id="rId4"/>
+              </a:rPr>
+              <a:t>CommunityMeeting-PandasMatplotlib</a:t>
+            </a:r>
+            <a:r>
+              <a:rPr lang="en-CA">
+                <a:hlinkClick r:id="rId4"/>
+              </a:rPr>
+              <a:t>: Community Meeting - Pandas Matplotlib (github.com)</a:t>
+            </a:r>
+            <a:endParaRPr lang="en-US" dirty="0"/>
+          </a:p>
+          <a:p>
+            <a:endParaRPr lang="en-US" dirty="0"/>
           </a:p>
           <a:p>
             <a:endParaRPr lang="en-US" dirty="0"/>
@@ -8434,18 +8458,18 @@
 </file>
 
 <file path=customXml/item2.xml><?xml version="1.0" encoding="utf-8"?>
+<p:properties xmlns:p="http://schemas.microsoft.com/office/2006/metadata/properties" xmlns:xsi="http://www.w3.org/2001/XMLSchema-instance" xmlns:pc="http://schemas.microsoft.com/office/infopath/2007/PartnerControls">
+  <documentManagement/>
+</p:properties>
+</file>
+
+<file path=customXml/item3.xml><?xml version="1.0" encoding="utf-8"?>
 <?mso-contentType ?>
 <FormTemplates xmlns="http://schemas.microsoft.com/sharepoint/v3/contenttype/forms">
   <Display>DocumentLibraryForm</Display>
   <Edit>DocumentLibraryForm</Edit>
   <New>DocumentLibraryForm</New>
 </FormTemplates>
-</file>
-
-<file path=customXml/item3.xml><?xml version="1.0" encoding="utf-8"?>
-<p:properties xmlns:p="http://schemas.microsoft.com/office/2006/metadata/properties" xmlns:xsi="http://www.w3.org/2001/XMLSchema-instance" xmlns:pc="http://schemas.microsoft.com/office/infopath/2007/PartnerControls">
-  <documentManagement/>
-</p:properties>
 </file>
 
 <file path=customXml/itemProps1.xml><?xml version="1.0" encoding="utf-8"?>
@@ -8467,14 +8491,6 @@
 </file>
 
 <file path=customXml/itemProps2.xml><?xml version="1.0" encoding="utf-8"?>
-<ds:datastoreItem xmlns:ds="http://schemas.openxmlformats.org/officeDocument/2006/customXml" ds:itemID="{9B73C864-B3B4-49AF-BF3C-77039C188C46}">
-  <ds:schemaRefs>
-    <ds:schemaRef ds:uri="http://schemas.microsoft.com/sharepoint/v3/contenttype/forms"/>
-  </ds:schemaRefs>
-</ds:datastoreItem>
-</file>
-
-<file path=customXml/itemProps3.xml><?xml version="1.0" encoding="utf-8"?>
 <ds:datastoreItem xmlns:ds="http://schemas.openxmlformats.org/officeDocument/2006/customXml" ds:itemID="{CE1CCC97-02FF-427F-9B8A-9534DA34C9B5}">
   <ds:schemaRefs>
     <ds:schemaRef ds:uri="http://purl.org/dc/elements/1.1/"/>
@@ -8488,4 +8504,12 @@
     <ds:schemaRef ds:uri="http://purl.org/dc/terms/"/>
   </ds:schemaRefs>
 </ds:datastoreItem>
+</file>
+
+<file path=customXml/itemProps3.xml><?xml version="1.0" encoding="utf-8"?>
+<ds:datastoreItem xmlns:ds="http://schemas.openxmlformats.org/officeDocument/2006/customXml" ds:itemID="{9B73C864-B3B4-49AF-BF3C-77039C188C46}">
+  <ds:schemaRefs>
+    <ds:schemaRef ds:uri="http://schemas.microsoft.com/sharepoint/v3/contenttype/forms"/>
+  </ds:schemaRefs>
+</ds:datastoreItem>
 </file>
</xml_diff>